<commit_message>
Personal KNN - Euclidian
</commit_message>
<xml_diff>
--- a/Documentation/Aplicație bazată pe microservicii pentru identificarea persoanelor cu interese similare - ppt.pptx
+++ b/Documentation/Aplicație bazată pe microservicii pentru identificarea persoanelor cu interese similare - ppt.pptx
@@ -1924,7 +1924,7 @@
           <a:p>
             <a:fld id="{09F0EA81-B16B-4286-962C-426653E37D2D}" type="datetimeFigureOut">
               <a:rPr lang="en-US" smtClean="0"/>
-              <a:t>07.05.2023</a:t>
+              <a:t>10.05.2023</a:t>
             </a:fld>
             <a:endParaRPr lang="en-US"/>
           </a:p>
@@ -2419,7 +2419,7 @@
           <a:p>
             <a:fld id="{7C83662B-3F05-4EF9-98D2-3D63E7FE1BE6}" type="datetime1">
               <a:rPr lang="ro-RO" smtClean="0"/>
-              <a:t>07.05.2023</a:t>
+              <a:t>10.05.2023</a:t>
             </a:fld>
             <a:endParaRPr lang="ro-RO"/>
           </a:p>
@@ -2627,7 +2627,7 @@
           <a:p>
             <a:fld id="{36911AFF-0B9B-4C4B-8D9F-D4404E00D623}" type="datetime1">
               <a:rPr lang="ro-RO" smtClean="0"/>
-              <a:t>07.05.2023</a:t>
+              <a:t>10.05.2023</a:t>
             </a:fld>
             <a:endParaRPr lang="ro-RO"/>
           </a:p>
@@ -2885,7 +2885,7 @@
           <a:p>
             <a:fld id="{08E3AFFD-7E89-4181-A30B-2358EF147999}" type="datetime1">
               <a:rPr lang="ro-RO" smtClean="0"/>
-              <a:t>07.05.2023</a:t>
+              <a:t>10.05.2023</a:t>
             </a:fld>
             <a:endParaRPr lang="ro-RO"/>
           </a:p>
@@ -3055,7 +3055,7 @@
           <a:p>
             <a:fld id="{B46C1AC2-D9E3-4669-97D3-AFCA07B8C4D0}" type="datetime1">
               <a:rPr lang="ro-RO" smtClean="0"/>
-              <a:t>07.05.2023</a:t>
+              <a:t>10.05.2023</a:t>
             </a:fld>
             <a:endParaRPr lang="ro-RO"/>
           </a:p>
@@ -3392,7 +3392,7 @@
           <a:p>
             <a:fld id="{0265ABD5-9DF2-4200-84A6-B592F8349A08}" type="datetime1">
               <a:rPr lang="ro-RO" smtClean="0"/>
-              <a:t>07.05.2023</a:t>
+              <a:t>10.05.2023</a:t>
             </a:fld>
             <a:endParaRPr lang="ro-RO"/>
           </a:p>
@@ -3667,7 +3667,7 @@
           <a:p>
             <a:fld id="{A9537EBF-27B2-4F11-9A6F-9094F8B76FC0}" type="datetime1">
               <a:rPr lang="ro-RO" smtClean="0"/>
-              <a:t>07.05.2023</a:t>
+              <a:t>10.05.2023</a:t>
             </a:fld>
             <a:endParaRPr lang="ro-RO"/>
           </a:p>
@@ -4046,7 +4046,7 @@
           <a:p>
             <a:fld id="{16B32345-271A-4408-AC76-5BB57761E157}" type="datetime1">
               <a:rPr lang="ro-RO" smtClean="0"/>
-              <a:t>07.05.2023</a:t>
+              <a:t>10.05.2023</a:t>
             </a:fld>
             <a:endParaRPr lang="ro-RO"/>
           </a:p>
@@ -4164,7 +4164,7 @@
           <a:p>
             <a:fld id="{010D44C5-ADD0-4DE1-9FAF-F55D439CCB59}" type="datetime1">
               <a:rPr lang="ro-RO" smtClean="0"/>
-              <a:t>07.05.2023</a:t>
+              <a:t>10.05.2023</a:t>
             </a:fld>
             <a:endParaRPr lang="ro-RO"/>
           </a:p>
@@ -4337,7 +4337,7 @@
           <a:p>
             <a:fld id="{F6CE65BF-9FE8-43E2-A11B-14AD81A37842}" type="datetime1">
               <a:rPr lang="ro-RO" smtClean="0"/>
-              <a:t>07.05.2023</a:t>
+              <a:t>10.05.2023</a:t>
             </a:fld>
             <a:endParaRPr lang="ro-RO"/>
           </a:p>
@@ -4693,7 +4693,7 @@
           <a:p>
             <a:fld id="{5A9F5D41-F459-4AEE-99E0-00176DC3BBB4}" type="datetime1">
               <a:rPr lang="ro-RO" smtClean="0"/>
-              <a:t>07.05.2023</a:t>
+              <a:t>10.05.2023</a:t>
             </a:fld>
             <a:endParaRPr lang="ro-RO"/>
           </a:p>
@@ -5072,7 +5072,7 @@
           <a:p>
             <a:fld id="{72CBB890-8E7C-42C5-B442-C4826CAB7D97}" type="datetime1">
               <a:rPr lang="ro-RO" smtClean="0"/>
-              <a:t>07.05.2023</a:t>
+              <a:t>10.05.2023</a:t>
             </a:fld>
             <a:endParaRPr lang="ro-RO"/>
           </a:p>
@@ -5361,7 +5361,7 @@
           <a:p>
             <a:fld id="{A46F4FDE-9A58-44FE-B7C9-150B578A2B4B}" type="datetime1">
               <a:rPr lang="ro-RO" smtClean="0"/>
-              <a:t>07.05.2023</a:t>
+              <a:t>10.05.2023</a:t>
             </a:fld>
             <a:endParaRPr lang="ro-RO"/>
           </a:p>
@@ -10703,21 +10703,16 @@
             </a:pPr>
             <a:r>
               <a:rPr lang="ro-RO" sz="2400" dirty="0"/>
-              <a:t>Securitate extra pe lângă </a:t>
-            </a:r>
-            <a:r>
-              <a:rPr lang="ro-RO" sz="2400" dirty="0" err="1"/>
-              <a:t>Spring</a:t>
+              <a:t>Securitate </a:t>
+            </a:r>
+            <a:r>
+              <a:rPr lang="en-US" sz="2400" dirty="0" err="1"/>
+              <a:t>sporit</a:t>
             </a:r>
             <a:r>
               <a:rPr lang="ro-RO" sz="2400" dirty="0"/>
-              <a:t> </a:t>
-            </a:r>
-            <a:r>
-              <a:rPr lang="ro-RO" sz="2400" dirty="0" err="1"/>
-              <a:t>Security</a:t>
-            </a:r>
-            <a:endParaRPr lang="ro-RO" sz="2400" dirty="0"/>
+              <a:t>ă</a:t>
+            </a:r>
           </a:p>
           <a:p>
             <a:pPr marL="342900" indent="-342900" algn="just">

</xml_diff>